<commit_message>
Cosmetic update powerpoint presentation
</commit_message>
<xml_diff>
--- a/doc/mirroring-strategy-2.pptx
+++ b/doc/mirroring-strategy-2.pptx
@@ -420,7 +420,7 @@
           <a:p>
             <a:fld id="{78ABE3C1-DBE1-495D-B57B-2849774B866A}" type="datetimeFigureOut">
               <a:rPr lang="en-US" dirty="0"/>
-              <a:t>30-01-19</a:t>
+              <a:t>31-01-19</a:t>
             </a:fld>
             <a:endParaRPr lang="en-US" dirty="0"/>
           </a:p>
@@ -829,7 +829,7 @@
           <a:p>
             <a:fld id="{446C117F-5CCF-4837-BE5F-2B92066CAFAF}" type="datetimeFigureOut">
               <a:rPr lang="en-US" dirty="0"/>
-              <a:t>30-01-19</a:t>
+              <a:t>31-01-19</a:t>
             </a:fld>
             <a:endParaRPr lang="en-US" dirty="0"/>
           </a:p>
@@ -1160,7 +1160,7 @@
           <a:p>
             <a:fld id="{84EB90BD-B6CE-46B7-997F-7313B992CCDC}" type="datetimeFigureOut">
               <a:rPr lang="en-US" dirty="0"/>
-              <a:t>30-01-19</a:t>
+              <a:t>31-01-19</a:t>
             </a:fld>
             <a:endParaRPr lang="en-US" dirty="0"/>
           </a:p>
@@ -1560,7 +1560,7 @@
           <a:p>
             <a:fld id="{CDB9D11F-B188-461D-B23F-39381795C052}" type="datetimeFigureOut">
               <a:rPr lang="en-US" dirty="0"/>
-              <a:t>30-01-19</a:t>
+              <a:t>31-01-19</a:t>
             </a:fld>
             <a:endParaRPr lang="en-US" dirty="0"/>
           </a:p>
@@ -2123,7 +2123,7 @@
           <a:p>
             <a:fld id="{52E6D8D9-55A2-4063-B0F3-121F44549695}" type="datetimeFigureOut">
               <a:rPr lang="en-US" dirty="0"/>
-              <a:t>30-01-19</a:t>
+              <a:t>31-01-19</a:t>
             </a:fld>
             <a:endParaRPr lang="en-US" dirty="0"/>
           </a:p>
@@ -2799,7 +2799,7 @@
           <a:p>
             <a:fld id="{D4B24536-994D-4021-A283-9F449C0DB509}" type="datetimeFigureOut">
               <a:rPr lang="en-US" dirty="0"/>
-              <a:t>30-01-19</a:t>
+              <a:t>31-01-19</a:t>
             </a:fld>
             <a:endParaRPr lang="en-US" dirty="0"/>
           </a:p>
@@ -3707,7 +3707,7 @@
           <a:p>
             <a:fld id="{3CBBBB78-C96F-47B7-AB17-D852CA960AC9}" type="datetimeFigureOut">
               <a:rPr lang="en-US" dirty="0"/>
-              <a:t>30-01-19</a:t>
+              <a:t>31-01-19</a:t>
             </a:fld>
             <a:endParaRPr lang="en-US" dirty="0"/>
           </a:p>
@@ -4015,7 +4015,7 @@
           <a:p>
             <a:fld id="{1FA3F48C-C7C6-4055-9F49-3777875E72AE}" type="datetimeFigureOut">
               <a:rPr lang="en-US" dirty="0"/>
-              <a:t>30-01-19</a:t>
+              <a:t>31-01-19</a:t>
             </a:fld>
             <a:endParaRPr lang="en-US" dirty="0"/>
           </a:p>
@@ -4274,7 +4274,7 @@
           <a:p>
             <a:fld id="{6178E61D-D431-422C-9764-11DAFE33AB63}" type="datetimeFigureOut">
               <a:rPr lang="en-US" dirty="0"/>
-              <a:t>30-01-19</a:t>
+              <a:t>31-01-19</a:t>
             </a:fld>
             <a:endParaRPr lang="en-US" dirty="0"/>
           </a:p>
@@ -4593,7 +4593,7 @@
           <a:p>
             <a:fld id="{12DE42F4-6EEF-4EF7-8ED4-2208F0F89A08}" type="datetimeFigureOut">
               <a:rPr lang="en-US" dirty="0"/>
-              <a:t>30-01-19</a:t>
+              <a:t>31-01-19</a:t>
             </a:fld>
             <a:endParaRPr lang="en-US" dirty="0"/>
           </a:p>
@@ -4977,7 +4977,7 @@
           <a:p>
             <a:fld id="{30578ACC-22D6-47C1-A373-4FD133E34F3C}" type="datetimeFigureOut">
               <a:rPr lang="en-US" dirty="0"/>
-              <a:t>30-01-19</a:t>
+              <a:t>31-01-19</a:t>
             </a:fld>
             <a:endParaRPr lang="en-US" dirty="0"/>
           </a:p>
@@ -5348,7 +5348,7 @@
           <a:p>
             <a:fld id="{4E5A6C69-6797-4E8A-BF37-F2C3751466E9}" type="datetimeFigureOut">
               <a:rPr lang="en-US" dirty="0"/>
-              <a:t>30-01-19</a:t>
+              <a:t>31-01-19</a:t>
             </a:fld>
             <a:endParaRPr lang="en-US" dirty="0"/>
           </a:p>
@@ -5849,7 +5849,7 @@
           <a:p>
             <a:fld id="{D82014A1-A632-4878-A0D3-F52BA7563730}" type="datetimeFigureOut">
               <a:rPr lang="en-US" dirty="0"/>
-              <a:t>30-01-19</a:t>
+              <a:t>31-01-19</a:t>
             </a:fld>
             <a:endParaRPr lang="en-US" dirty="0"/>
           </a:p>
@@ -6101,7 +6101,7 @@
           <a:p>
             <a:fld id="{CE99F462-093F-4566-844B-4C71F2739DA5}" type="datetimeFigureOut">
               <a:rPr lang="en-US" dirty="0"/>
-              <a:t>30-01-19</a:t>
+              <a:t>31-01-19</a:t>
             </a:fld>
             <a:endParaRPr lang="en-US" dirty="0"/>
           </a:p>
@@ -6259,7 +6259,7 @@
           <a:p>
             <a:fld id="{3D24A7AC-904D-4781-85BA-7D10C17ED021}" type="datetimeFigureOut">
               <a:rPr lang="en-US" dirty="0"/>
-              <a:t>30-01-19</a:t>
+              <a:t>31-01-19</a:t>
             </a:fld>
             <a:endParaRPr lang="en-US" dirty="0"/>
           </a:p>
@@ -6644,7 +6644,7 @@
           <a:p>
             <a:fld id="{E331444B-B92B-4E27-8C94-BB93EAF5CB18}" type="datetimeFigureOut">
               <a:rPr lang="en-US" dirty="0"/>
-              <a:t>30-01-19</a:t>
+              <a:t>31-01-19</a:t>
             </a:fld>
             <a:endParaRPr lang="en-US" dirty="0"/>
           </a:p>
@@ -7048,7 +7048,7 @@
           <a:p>
             <a:fld id="{363EFA5E-FA76-400D-B3DC-F0BA90E6D107}" type="datetimeFigureOut">
               <a:rPr lang="en-US" dirty="0"/>
-              <a:t>30-01-19</a:t>
+              <a:t>31-01-19</a:t>
             </a:fld>
             <a:endParaRPr lang="en-US" dirty="0"/>
           </a:p>
@@ -7287,7 +7287,7 @@
           <a:p>
             <a:fld id="{9D6E9DEC-419B-4CC5-A080-3B06BD5A8291}" type="datetimeFigureOut">
               <a:rPr lang="en-US" dirty="0"/>
-              <a:t>30-01-19</a:t>
+              <a:t>31-01-19</a:t>
             </a:fld>
             <a:endParaRPr lang="en-US" dirty="0"/>
           </a:p>
@@ -7741,12 +7741,27 @@
         </p:nvSpPr>
         <p:spPr/>
         <p:txBody>
-          <a:bodyPr/>
+          <a:bodyPr>
+            <a:normAutofit fontScale="92500" lnSpcReduction="20000"/>
+          </a:bodyPr>
           <a:lstStyle/>
           <a:p>
             <a:r>
               <a:rPr lang="en-US" dirty="0"/>
-              <a:t>Description</a:t>
+              <a:t>Software Architecture Specification 2019-01-31</a:t>
+            </a:r>
+            <a:br>
+              <a:rPr lang="en-US" dirty="0"/>
+            </a:br>
+            <a:endParaRPr lang="en-US" dirty="0"/>
+          </a:p>
+          <a:p>
+            <a:br>
+              <a:rPr lang="en-US" dirty="0"/>
+            </a:br>
+            <a:r>
+              <a:rPr lang="en-US" dirty="0"/>
+              <a:t>Dimitri DeFigueiredo Ph.D.</a:t>
             </a:r>
           </a:p>
         </p:txBody>

</xml_diff>